<commit_message>
Lab 3 small edits
</commit_message>
<xml_diff>
--- a/classes/prog2015/Lab3.pptx
+++ b/classes/prog2015/Lab3.pptx
@@ -9,6 +9,7 @@
     <p:sldId id="257" r:id="rId3"/>
     <p:sldId id="258" r:id="rId4"/>
     <p:sldId id="259" r:id="rId5"/>
+    <p:sldId id="260" r:id="rId6"/>
   </p:sldIdLst>
   <p:sldSz cx="9144000" cy="6858000" type="screen4x3"/>
   <p:notesSz cx="6858000" cy="9144000"/>
@@ -292,7 +293,7 @@
             <a:fld id="{1D8BD707-D9CF-40AE-B4C6-C98DA3205C09}" type="datetimeFigureOut">
               <a:rPr lang="en-US" smtClean="0"/>
               <a:pPr/>
-              <a:t>9/4/2015</a:t>
+              <a:t>9/8/2015</a:t>
             </a:fld>
             <a:endParaRPr lang="en-US"/>
           </a:p>
@@ -459,7 +460,7 @@
             <a:fld id="{1D8BD707-D9CF-40AE-B4C6-C98DA3205C09}" type="datetimeFigureOut">
               <a:rPr lang="en-US" smtClean="0"/>
               <a:pPr/>
-              <a:t>9/4/2015</a:t>
+              <a:t>9/8/2015</a:t>
             </a:fld>
             <a:endParaRPr lang="en-US"/>
           </a:p>
@@ -636,7 +637,7 @@
             <a:fld id="{1D8BD707-D9CF-40AE-B4C6-C98DA3205C09}" type="datetimeFigureOut">
               <a:rPr lang="en-US" smtClean="0"/>
               <a:pPr/>
-              <a:t>9/4/2015</a:t>
+              <a:t>9/8/2015</a:t>
             </a:fld>
             <a:endParaRPr lang="en-US"/>
           </a:p>
@@ -803,7 +804,7 @@
             <a:fld id="{1D8BD707-D9CF-40AE-B4C6-C98DA3205C09}" type="datetimeFigureOut">
               <a:rPr lang="en-US" smtClean="0"/>
               <a:pPr/>
-              <a:t>9/4/2015</a:t>
+              <a:t>9/8/2015</a:t>
             </a:fld>
             <a:endParaRPr lang="en-US"/>
           </a:p>
@@ -1046,7 +1047,7 @@
             <a:fld id="{1D8BD707-D9CF-40AE-B4C6-C98DA3205C09}" type="datetimeFigureOut">
               <a:rPr lang="en-US" smtClean="0"/>
               <a:pPr/>
-              <a:t>9/4/2015</a:t>
+              <a:t>9/8/2015</a:t>
             </a:fld>
             <a:endParaRPr lang="en-US"/>
           </a:p>
@@ -1331,7 +1332,7 @@
             <a:fld id="{1D8BD707-D9CF-40AE-B4C6-C98DA3205C09}" type="datetimeFigureOut">
               <a:rPr lang="en-US" smtClean="0"/>
               <a:pPr/>
-              <a:t>9/4/2015</a:t>
+              <a:t>9/8/2015</a:t>
             </a:fld>
             <a:endParaRPr lang="en-US"/>
           </a:p>
@@ -1750,7 +1751,7 @@
             <a:fld id="{1D8BD707-D9CF-40AE-B4C6-C98DA3205C09}" type="datetimeFigureOut">
               <a:rPr lang="en-US" smtClean="0"/>
               <a:pPr/>
-              <a:t>9/4/2015</a:t>
+              <a:t>9/8/2015</a:t>
             </a:fld>
             <a:endParaRPr lang="en-US"/>
           </a:p>
@@ -1865,7 +1866,7 @@
             <a:fld id="{1D8BD707-D9CF-40AE-B4C6-C98DA3205C09}" type="datetimeFigureOut">
               <a:rPr lang="en-US" smtClean="0"/>
               <a:pPr/>
-              <a:t>9/4/2015</a:t>
+              <a:t>9/8/2015</a:t>
             </a:fld>
             <a:endParaRPr lang="en-US"/>
           </a:p>
@@ -1957,7 +1958,7 @@
             <a:fld id="{1D8BD707-D9CF-40AE-B4C6-C98DA3205C09}" type="datetimeFigureOut">
               <a:rPr lang="en-US" smtClean="0"/>
               <a:pPr/>
-              <a:t>9/4/2015</a:t>
+              <a:t>9/8/2015</a:t>
             </a:fld>
             <a:endParaRPr lang="en-US"/>
           </a:p>
@@ -2231,7 +2232,7 @@
             <a:fld id="{1D8BD707-D9CF-40AE-B4C6-C98DA3205C09}" type="datetimeFigureOut">
               <a:rPr lang="en-US" smtClean="0"/>
               <a:pPr/>
-              <a:t>9/4/2015</a:t>
+              <a:t>9/8/2015</a:t>
             </a:fld>
             <a:endParaRPr lang="en-US"/>
           </a:p>
@@ -2481,7 +2482,7 @@
             <a:fld id="{1D8BD707-D9CF-40AE-B4C6-C98DA3205C09}" type="datetimeFigureOut">
               <a:rPr lang="en-US" smtClean="0"/>
               <a:pPr/>
-              <a:t>9/4/2015</a:t>
+              <a:t>9/8/2015</a:t>
             </a:fld>
             <a:endParaRPr lang="en-US"/>
           </a:p>
@@ -2691,7 +2692,7 @@
             <a:fld id="{1D8BD707-D9CF-40AE-B4C6-C98DA3205C09}" type="datetimeFigureOut">
               <a:rPr lang="en-US" smtClean="0"/>
               <a:pPr/>
-              <a:t>9/4/2015</a:t>
+              <a:t>9/8/2015</a:t>
             </a:fld>
             <a:endParaRPr lang="en-US"/>
           </a:p>
@@ -3101,11 +3102,7 @@
           <a:p>
             <a:r>
               <a:rPr lang="en-US" dirty="0" smtClean="0"/>
-              <a:t>afodor@uncc.edu </a:t>
-            </a:r>
-            <a:r>
-              <a:rPr lang="en-US" dirty="0" smtClean="0"/>
-              <a:t>and </a:t>
+              <a:t>afodor@uncc.edu and </a:t>
             </a:r>
             <a:r>
               <a:rPr lang="en-US" dirty="0" smtClean="0">
@@ -3123,7 +3120,6 @@
               <a:rPr lang="en-US" dirty="0" smtClean="0"/>
               <a:t>Your code and/or instructions are due before class on Sep. 14th</a:t>
             </a:r>
-            <a:endParaRPr lang="en-US" dirty="0" smtClean="0"/>
           </a:p>
         </p:txBody>
       </p:sp>
@@ -3179,12 +3175,12 @@
               <a:t>This week, we are going to make a quiz to drill </a:t>
             </a:r>
             <a:r>
-              <a:rPr lang="en-US" dirty="0" err="1" smtClean="0"/>
-              <a:t>amio</a:t>
-            </a:r>
-            <a:r>
-              <a:rPr lang="en-US" dirty="0" smtClean="0"/>
-              <a:t> acids</a:t>
+              <a:rPr lang="en-US" dirty="0" smtClean="0"/>
+              <a:t>amino </a:t>
+            </a:r>
+            <a:r>
+              <a:rPr lang="en-US" dirty="0" smtClean="0"/>
+              <a:t>acids</a:t>
             </a:r>
             <a:endParaRPr lang="en-US" dirty="0"/>
           </a:p>
@@ -3229,21 +3225,21 @@
           <a:p>
             <a:r>
               <a:rPr lang="en-US" dirty="0" smtClean="0"/>
-              <a:t>	</a:t>
-            </a:r>
-            <a:r>
-              <a:rPr lang="en-US" dirty="0" smtClean="0"/>
-              <a:t>The quiz ends after 30 seconds or when there is a single in-correct answer.</a:t>
-            </a:r>
-          </a:p>
-          <a:p>
-            <a:r>
-              <a:rPr lang="en-US" dirty="0" smtClean="0"/>
-              <a:t>	</a:t>
-            </a:r>
-            <a:r>
-              <a:rPr lang="en-US" dirty="0" smtClean="0"/>
-              <a:t>The program displays the full name of an amino acid (like “</a:t>
+              <a:t>	The quiz ends after 30 seconds or when there is a single </a:t>
+            </a:r>
+            <a:r>
+              <a:rPr lang="en-US" dirty="0" smtClean="0"/>
+              <a:t>incorrect </a:t>
+            </a:r>
+            <a:r>
+              <a:rPr lang="en-US" dirty="0" smtClean="0"/>
+              <a:t>answer.</a:t>
+            </a:r>
+          </a:p>
+          <a:p>
+            <a:r>
+              <a:rPr lang="en-US" dirty="0" smtClean="0"/>
+              <a:t>	The program displays the full name of an amino acid (like “</a:t>
             </a:r>
             <a:r>
               <a:rPr lang="en-US" dirty="0" err="1" smtClean="0"/>
@@ -3257,31 +3253,31 @@
           <a:p>
             <a:r>
               <a:rPr lang="en-US" dirty="0" smtClean="0"/>
-              <a:t>	</a:t>
-            </a:r>
-            <a:r>
-              <a:rPr lang="en-US" dirty="0" smtClean="0"/>
-              <a:t>	and asks the user to type in the one character code (like a)</a:t>
-            </a:r>
-          </a:p>
-          <a:p>
-            <a:r>
-              <a:rPr lang="en-US" dirty="0" smtClean="0"/>
-              <a:t>	</a:t>
-            </a:r>
-            <a:r>
-              <a:rPr lang="en-US" dirty="0" smtClean="0"/>
-              <a:t>The quiz ignores case in the answer.</a:t>
-            </a:r>
-          </a:p>
-          <a:p>
-            <a:r>
-              <a:rPr lang="en-US" dirty="0" smtClean="0"/>
-              <a:t>	</a:t>
-            </a:r>
-            <a:r>
-              <a:rPr lang="en-US" dirty="0" smtClean="0"/>
-              <a:t>The total score is the number correct answers…</a:t>
+              <a:t>		and asks the user to type in the one character code (like a)</a:t>
+            </a:r>
+          </a:p>
+          <a:p>
+            <a:r>
+              <a:rPr lang="en-US" dirty="0" smtClean="0"/>
+              <a:t>	The quiz ignores case in the answer.</a:t>
+            </a:r>
+          </a:p>
+          <a:p>
+            <a:r>
+              <a:rPr lang="en-US" dirty="0" smtClean="0"/>
+              <a:t>	The total score is the </a:t>
+            </a:r>
+            <a:r>
+              <a:rPr lang="en-US" smtClean="0"/>
+              <a:t>number </a:t>
+            </a:r>
+            <a:r>
+              <a:rPr lang="en-US" smtClean="0"/>
+              <a:t>of correct </a:t>
+            </a:r>
+            <a:r>
+              <a:rPr lang="en-US" dirty="0" smtClean="0"/>
+              <a:t>answers…</a:t>
             </a:r>
           </a:p>
           <a:p>
@@ -3305,15 +3301,7 @@
           <a:p>
             <a:r>
               <a:rPr lang="en-US" dirty="0" smtClean="0"/>
-              <a:t>	</a:t>
-            </a:r>
-            <a:r>
-              <a:rPr lang="en-US" dirty="0" smtClean="0"/>
-              <a:t>	</a:t>
-            </a:r>
-            <a:r>
-              <a:rPr lang="en-US" dirty="0" smtClean="0"/>
-              <a:t> String </a:t>
+              <a:t>		 String </a:t>
             </a:r>
             <a:r>
               <a:rPr lang="en-US" dirty="0" err="1" smtClean="0"/>
@@ -3358,25 +3346,13 @@
           <a:p>
             <a:r>
               <a:rPr lang="en-US" dirty="0" smtClean="0"/>
-              <a:t>	</a:t>
-            </a:r>
-            <a:r>
-              <a:rPr lang="en-US" dirty="0" smtClean="0"/>
-              <a:t>You can get the first character by using code like:</a:t>
-            </a:r>
-          </a:p>
-          <a:p>
-            <a:r>
-              <a:rPr lang="en-US" dirty="0" smtClean="0"/>
-              <a:t>	</a:t>
-            </a:r>
-            <a:r>
-              <a:rPr lang="en-US" dirty="0" smtClean="0"/>
-              <a:t>	</a:t>
-            </a:r>
-            <a:r>
-              <a:rPr lang="en-US" dirty="0" smtClean="0"/>
-              <a:t> String </a:t>
+              <a:t>	You can get the first character by using code like:</a:t>
+            </a:r>
+          </a:p>
+          <a:p>
+            <a:r>
+              <a:rPr lang="en-US" dirty="0" smtClean="0"/>
+              <a:t>		 String </a:t>
             </a:r>
             <a:r>
               <a:rPr lang="en-US" dirty="0" err="1" smtClean="0"/>
@@ -3392,11 +3368,7 @@
             </a:r>
             <a:r>
               <a:rPr lang="en-US" dirty="0" smtClean="0"/>
-              <a:t>(0</a:t>
-            </a:r>
-            <a:r>
-              <a:rPr lang="en-US" dirty="0" smtClean="0"/>
-              <a:t>);</a:t>
+              <a:t>(0);</a:t>
             </a:r>
           </a:p>
           <a:p>
@@ -3419,28 +3391,23 @@
           <a:p>
             <a:r>
               <a:rPr lang="en-US" dirty="0" smtClean="0"/>
+              <a:t>	(not Eclipse).</a:t>
+            </a:r>
+          </a:p>
+          <a:p>
+            <a:endParaRPr lang="en-US" dirty="0" smtClean="0"/>
+          </a:p>
+          <a:p>
+            <a:r>
+              <a:rPr lang="en-US" dirty="0" smtClean="0"/>
+              <a:t>	You can edit in Eclipse but use the command line to run the program…</a:t>
+            </a:r>
+          </a:p>
+          <a:p>
+            <a:r>
+              <a:rPr lang="en-US" dirty="0" smtClean="0"/>
               <a:t>	</a:t>
             </a:r>
-            <a:r>
-              <a:rPr lang="en-US" dirty="0" smtClean="0"/>
-              <a:t>(not Eclipse).</a:t>
-            </a:r>
-          </a:p>
-          <a:p>
-            <a:endParaRPr lang="en-US" dirty="0" smtClean="0"/>
-          </a:p>
-          <a:p>
-            <a:r>
-              <a:rPr lang="en-US" dirty="0" smtClean="0"/>
-              <a:t>	You can edit in Eclipse but use the command line to run the program…</a:t>
-            </a:r>
-          </a:p>
-          <a:p>
-            <a:r>
-              <a:rPr lang="en-US" dirty="0" smtClean="0"/>
-              <a:t>	</a:t>
-            </a:r>
-            <a:endParaRPr lang="en-US" dirty="0" smtClean="0"/>
           </a:p>
         </p:txBody>
       </p:sp>
@@ -3531,6 +3498,36 @@
           </a:ln>
         </p:spPr>
       </p:pic>
+      <p:sp>
+        <p:nvSpPr>
+          <p:cNvPr id="5" name="TextBox 4"/>
+          <p:cNvSpPr txBox="1"/>
+          <p:nvPr/>
+        </p:nvSpPr>
+        <p:spPr>
+          <a:xfrm>
+            <a:off x="304800" y="4648200"/>
+            <a:ext cx="8787983" cy="369332"/>
+          </a:xfrm>
+          <a:prstGeom prst="rect">
+            <a:avLst/>
+          </a:prstGeom>
+          <a:noFill/>
+        </p:spPr>
+        <p:txBody>
+          <a:bodyPr wrap="none" rtlCol="0">
+            <a:spAutoFit/>
+          </a:bodyPr>
+          <a:lstStyle/>
+          <a:p>
+            <a:r>
+              <a:rPr lang="en-US" dirty="0" smtClean="0"/>
+              <a:t>(We can have an informal contest to see who can get the most answers right in 30 seconds).</a:t>
+            </a:r>
+            <a:endParaRPr lang="en-US" dirty="0"/>
+          </a:p>
+        </p:txBody>
+      </p:sp>
     </p:spTree>
   </p:cSld>
   <p:clrMapOvr>
@@ -3624,165 +3621,20 @@
           <a:p>
             <a:r>
               <a:rPr lang="en-US" dirty="0" smtClean="0"/>
-              <a:t>{ "</a:t>
-            </a:r>
-            <a:r>
-              <a:rPr lang="en-US" dirty="0" smtClean="0"/>
-              <a:t>A</a:t>
-            </a:r>
-            <a:r>
-              <a:rPr lang="en-US" dirty="0" smtClean="0"/>
-              <a:t>","</a:t>
-            </a:r>
-            <a:r>
-              <a:rPr lang="en-US" dirty="0" smtClean="0"/>
-              <a:t>R", </a:t>
-            </a:r>
-            <a:r>
-              <a:rPr lang="en-US" dirty="0" smtClean="0"/>
-              <a:t>"</a:t>
-            </a:r>
-            <a:r>
-              <a:rPr lang="en-US" dirty="0" smtClean="0"/>
-              <a:t>N", </a:t>
-            </a:r>
-            <a:r>
-              <a:rPr lang="en-US" dirty="0" smtClean="0"/>
-              <a:t>"</a:t>
-            </a:r>
-            <a:r>
-              <a:rPr lang="en-US" dirty="0" smtClean="0"/>
-              <a:t>D", </a:t>
-            </a:r>
-            <a:r>
-              <a:rPr lang="en-US" dirty="0" smtClean="0"/>
-              <a:t>"</a:t>
-            </a:r>
-            <a:r>
-              <a:rPr lang="en-US" dirty="0" smtClean="0"/>
-              <a:t>C", </a:t>
-            </a:r>
-            <a:r>
-              <a:rPr lang="en-US" dirty="0" smtClean="0"/>
-              <a:t>"</a:t>
-            </a:r>
-            <a:r>
-              <a:rPr lang="en-US" dirty="0" smtClean="0"/>
-              <a:t>Q", </a:t>
-            </a:r>
-            <a:r>
-              <a:rPr lang="en-US" dirty="0" smtClean="0"/>
-              <a:t>"</a:t>
-            </a:r>
-            <a:r>
-              <a:rPr lang="en-US" dirty="0" smtClean="0"/>
-              <a:t>E", </a:t>
-            </a:r>
-          </a:p>
-          <a:p>
-            <a:r>
-              <a:rPr lang="en-US" dirty="0" smtClean="0"/>
-              <a:t>"G",  </a:t>
-            </a:r>
-            <a:r>
-              <a:rPr lang="en-US" dirty="0" smtClean="0"/>
-              <a:t>"</a:t>
-            </a:r>
-            <a:r>
-              <a:rPr lang="en-US" dirty="0" smtClean="0"/>
-              <a:t>H", </a:t>
-            </a:r>
-            <a:r>
-              <a:rPr lang="en-US" dirty="0" smtClean="0"/>
-              <a:t>"</a:t>
-            </a:r>
-            <a:r>
-              <a:rPr lang="en-US" dirty="0" smtClean="0"/>
-              <a:t>I", </a:t>
-            </a:r>
-            <a:r>
-              <a:rPr lang="en-US" dirty="0" smtClean="0"/>
-              <a:t>"</a:t>
-            </a:r>
-            <a:r>
-              <a:rPr lang="en-US" dirty="0" smtClean="0"/>
-              <a:t>L", </a:t>
-            </a:r>
-            <a:r>
-              <a:rPr lang="en-US" dirty="0" smtClean="0"/>
-              <a:t>"</a:t>
-            </a:r>
-            <a:r>
-              <a:rPr lang="en-US" dirty="0" smtClean="0"/>
-              <a:t>K", </a:t>
-            </a:r>
-            <a:r>
-              <a:rPr lang="en-US" dirty="0" smtClean="0"/>
-              <a:t>"</a:t>
-            </a:r>
-            <a:r>
-              <a:rPr lang="en-US" dirty="0" smtClean="0"/>
-              <a:t>M", </a:t>
-            </a:r>
-            <a:r>
-              <a:rPr lang="en-US" dirty="0" smtClean="0"/>
-              <a:t>"</a:t>
-            </a:r>
-            <a:r>
-              <a:rPr lang="en-US" dirty="0" smtClean="0"/>
-              <a:t>F", </a:t>
-            </a:r>
-          </a:p>
-          <a:p>
-            <a:r>
-              <a:rPr lang="en-US" dirty="0" smtClean="0"/>
-              <a:t>"P", </a:t>
-            </a:r>
-            <a:r>
-              <a:rPr lang="en-US" dirty="0" smtClean="0"/>
-              <a:t>"</a:t>
-            </a:r>
-            <a:r>
-              <a:rPr lang="en-US" dirty="0" smtClean="0"/>
-              <a:t>S", </a:t>
-            </a:r>
-            <a:r>
-              <a:rPr lang="en-US" dirty="0" smtClean="0"/>
-              <a:t>"</a:t>
-            </a:r>
-            <a:r>
-              <a:rPr lang="en-US" dirty="0" smtClean="0"/>
-              <a:t>T", </a:t>
-            </a:r>
-            <a:r>
-              <a:rPr lang="en-US" dirty="0" smtClean="0"/>
-              <a:t>"</a:t>
-            </a:r>
-            <a:r>
-              <a:rPr lang="en-US" dirty="0" smtClean="0"/>
-              <a:t>W", </a:t>
-            </a:r>
-            <a:r>
-              <a:rPr lang="en-US" dirty="0" smtClean="0"/>
-              <a:t>"</a:t>
-            </a:r>
-            <a:r>
-              <a:rPr lang="en-US" dirty="0" smtClean="0"/>
-              <a:t>Y", </a:t>
-            </a:r>
-            <a:r>
-              <a:rPr lang="en-US" dirty="0" smtClean="0"/>
-              <a:t>"</a:t>
-            </a:r>
-            <a:r>
-              <a:rPr lang="en-US" dirty="0" smtClean="0"/>
-              <a:t>V" </a:t>
-            </a:r>
-            <a:r>
-              <a:rPr lang="en-US" dirty="0" smtClean="0"/>
-              <a:t>};</a:t>
-            </a:r>
-            <a:endParaRPr lang="en-US" dirty="0" smtClean="0"/>
+              <a:t>{ "A","R", "N", "D", "C", "Q", "E", </a:t>
+            </a:r>
+          </a:p>
+          <a:p>
+            <a:r>
+              <a:rPr lang="en-US" dirty="0" smtClean="0"/>
+              <a:t>"G",  "H", "I", "L", "K", "M", "F", </a:t>
+            </a:r>
+          </a:p>
+          <a:p>
+            <a:r>
+              <a:rPr lang="en-US" dirty="0" smtClean="0"/>
+              <a:t>"P", "S", "T", "W", "Y", "V" };</a:t>
+            </a:r>
           </a:p>
           <a:p>
             <a:endParaRPr lang="en-US" dirty="0" smtClean="0"/>
@@ -3810,23 +3662,11 @@
             </a:r>
             <a:r>
               <a:rPr lang="en-US" dirty="0" err="1" smtClean="0"/>
-              <a:t>alanine</a:t>
-            </a:r>
-            <a:r>
-              <a:rPr lang="en-US" dirty="0" err="1" smtClean="0"/>
-              <a:t>","</a:t>
-            </a:r>
-            <a:r>
-              <a:rPr lang="en-US" dirty="0" err="1" smtClean="0"/>
-              <a:t>arginine</a:t>
-            </a:r>
-            <a:r>
-              <a:rPr lang="en-US" dirty="0" smtClean="0"/>
-              <a:t>", </a:t>
-            </a:r>
-            <a:r>
-              <a:rPr lang="en-US" dirty="0" smtClean="0"/>
-              <a:t>"</a:t>
+              <a:t>alanine","arginine</a:t>
+            </a:r>
+            <a:r>
+              <a:rPr lang="en-US" dirty="0" smtClean="0"/>
+              <a:t>", "</a:t>
             </a:r>
             <a:r>
               <a:rPr lang="en-US" dirty="0" err="1" smtClean="0"/>
@@ -3840,11 +3680,7 @@
           <a:p>
             <a:r>
               <a:rPr lang="en-US" dirty="0" smtClean="0"/>
-              <a:t>"aspartic acid", </a:t>
-            </a:r>
-            <a:r>
-              <a:rPr lang="en-US" dirty="0" smtClean="0"/>
-              <a:t>"</a:t>
+              <a:t>"aspartic acid", "</a:t>
             </a:r>
             <a:r>
               <a:rPr lang="en-US" dirty="0" err="1" smtClean="0"/>
@@ -3858,11 +3694,7 @@
           <a:p>
             <a:r>
               <a:rPr lang="en-US" dirty="0" smtClean="0"/>
-              <a:t>"glutamine",  </a:t>
-            </a:r>
-            <a:r>
-              <a:rPr lang="en-US" dirty="0" smtClean="0"/>
-              <a:t>"</a:t>
+              <a:t>"glutamine",  "</a:t>
             </a:r>
             <a:r>
               <a:rPr lang="en-US" dirty="0" err="1" smtClean="0"/>
@@ -3870,11 +3702,7 @@
             </a:r>
             <a:r>
               <a:rPr lang="en-US" dirty="0" smtClean="0"/>
-              <a:t> </a:t>
-            </a:r>
-            <a:r>
-              <a:rPr lang="en-US" dirty="0" smtClean="0"/>
-              <a:t>acid",</a:t>
+              <a:t> acid",</a:t>
             </a:r>
           </a:p>
           <a:p>
@@ -3888,23 +3716,11 @@
             </a:r>
             <a:r>
               <a:rPr lang="en-US" dirty="0" smtClean="0"/>
-              <a:t>" </a:t>
-            </a:r>
-            <a:r>
-              <a:rPr lang="en-US" dirty="0" smtClean="0"/>
-              <a:t>,"</a:t>
+              <a:t>" ,"</a:t>
             </a:r>
             <a:r>
               <a:rPr lang="en-US" dirty="0" err="1" smtClean="0"/>
-              <a:t>histidine</a:t>
-            </a:r>
-            <a:r>
-              <a:rPr lang="en-US" dirty="0" err="1" smtClean="0"/>
-              <a:t>","</a:t>
-            </a:r>
-            <a:r>
-              <a:rPr lang="en-US" dirty="0" err="1" smtClean="0"/>
-              <a:t>isoleucine</a:t>
+              <a:t>histidine","isoleucine</a:t>
             </a:r>
             <a:r>
               <a:rPr lang="en-US" dirty="0" smtClean="0"/>
@@ -3922,19 +3738,7 @@
             </a:r>
             <a:r>
               <a:rPr lang="en-US" dirty="0" smtClean="0"/>
-              <a:t>",  </a:t>
-            </a:r>
-            <a:r>
-              <a:rPr lang="en-US" dirty="0" smtClean="0"/>
-              <a:t>"</a:t>
-            </a:r>
-            <a:r>
-              <a:rPr lang="en-US" dirty="0" smtClean="0"/>
-              <a:t>lysine", </a:t>
-            </a:r>
-            <a:r>
-              <a:rPr lang="en-US" dirty="0" smtClean="0"/>
-              <a:t>"</a:t>
+              <a:t>",  "lysine", "</a:t>
             </a:r>
             <a:r>
               <a:rPr lang="en-US" dirty="0" err="1" smtClean="0"/>
@@ -3948,11 +3752,7 @@
           <a:p>
             <a:r>
               <a:rPr lang="en-US" dirty="0" smtClean="0"/>
-              <a:t>"phenylalanine", </a:t>
-            </a:r>
-            <a:r>
-              <a:rPr lang="en-US" dirty="0" smtClean="0"/>
-              <a:t>"</a:t>
+              <a:t>"phenylalanine", "</a:t>
             </a:r>
             <a:r>
               <a:rPr lang="en-US" dirty="0" err="1" smtClean="0"/>
@@ -3970,23 +3770,7 @@
             </a:r>
             <a:r>
               <a:rPr lang="en-US" dirty="0" err="1" smtClean="0"/>
-              <a:t>serine</a:t>
-            </a:r>
-            <a:r>
-              <a:rPr lang="en-US" dirty="0" err="1" smtClean="0"/>
-              <a:t>","</a:t>
-            </a:r>
-            <a:r>
-              <a:rPr lang="en-US" dirty="0" err="1" smtClean="0"/>
-              <a:t>threonine</a:t>
-            </a:r>
-            <a:r>
-              <a:rPr lang="en-US" dirty="0" err="1" smtClean="0"/>
-              <a:t>","</a:t>
-            </a:r>
-            <a:r>
-              <a:rPr lang="en-US" dirty="0" err="1" smtClean="0"/>
-              <a:t>tryptophan</a:t>
+              <a:t>serine","threonine","tryptophan</a:t>
             </a:r>
             <a:r>
               <a:rPr lang="en-US" dirty="0" smtClean="0"/>
@@ -3996,11 +3780,7 @@
           <a:p>
             <a:r>
               <a:rPr lang="en-US" dirty="0" smtClean="0"/>
-              <a:t>"tyrosine", </a:t>
-            </a:r>
-            <a:r>
-              <a:rPr lang="en-US" dirty="0" smtClean="0"/>
-              <a:t>"</a:t>
+              <a:t>"tyrosine", "</a:t>
             </a:r>
             <a:r>
               <a:rPr lang="en-US" dirty="0" err="1" smtClean="0"/>
@@ -4009,6 +3789,103 @@
             <a:r>
               <a:rPr lang="en-US" dirty="0" smtClean="0"/>
               <a:t>"};</a:t>
+            </a:r>
+            <a:endParaRPr lang="en-US" dirty="0"/>
+          </a:p>
+        </p:txBody>
+      </p:sp>
+    </p:spTree>
+  </p:cSld>
+  <p:clrMapOvr>
+    <a:masterClrMapping/>
+  </p:clrMapOvr>
+</p:sld>
+</file>
+
+<file path=ppt/slides/slide5.xml><?xml version="1.0" encoding="utf-8"?>
+<p:sld xmlns:a="http://schemas.openxmlformats.org/drawingml/2006/main" xmlns:r="http://schemas.openxmlformats.org/officeDocument/2006/relationships" xmlns:p="http://schemas.openxmlformats.org/presentationml/2006/main">
+  <p:cSld>
+    <p:spTree>
+      <p:nvGrpSpPr>
+        <p:cNvPr id="1" name=""/>
+        <p:cNvGrpSpPr/>
+        <p:nvPr/>
+      </p:nvGrpSpPr>
+      <p:grpSpPr>
+        <a:xfrm>
+          <a:off x="0" y="0"/>
+          <a:ext cx="0" cy="0"/>
+          <a:chOff x="0" y="0"/>
+          <a:chExt cx="0" cy="0"/>
+        </a:xfrm>
+      </p:grpSpPr>
+      <p:sp>
+        <p:nvSpPr>
+          <p:cNvPr id="4" name="TextBox 3"/>
+          <p:cNvSpPr txBox="1"/>
+          <p:nvPr/>
+        </p:nvSpPr>
+        <p:spPr>
+          <a:xfrm>
+            <a:off x="228600" y="531674"/>
+            <a:ext cx="8849667" cy="2862322"/>
+          </a:xfrm>
+          <a:prstGeom prst="rect">
+            <a:avLst/>
+          </a:prstGeom>
+          <a:noFill/>
+        </p:spPr>
+        <p:txBody>
+          <a:bodyPr wrap="none" rtlCol="0">
+            <a:spAutoFit/>
+          </a:bodyPr>
+          <a:lstStyle/>
+          <a:p>
+            <a:r>
+              <a:rPr lang="en-US" dirty="0" smtClean="0"/>
+              <a:t>Improvements/modifications (for extra credit)</a:t>
+            </a:r>
+          </a:p>
+          <a:p>
+            <a:endParaRPr lang="en-US" dirty="0" smtClean="0"/>
+          </a:p>
+          <a:p>
+            <a:r>
+              <a:rPr lang="en-US" dirty="0" smtClean="0"/>
+              <a:t>Make the # of seconds a parameter that can be passed in on the command line.</a:t>
+            </a:r>
+          </a:p>
+          <a:p>
+            <a:endParaRPr lang="en-US" dirty="0" smtClean="0"/>
+          </a:p>
+          <a:p>
+            <a:r>
+              <a:rPr lang="en-US" dirty="0" smtClean="0"/>
+              <a:t>Alternatively, allow an option that will ask a certain number of questions before terminating.</a:t>
+            </a:r>
+          </a:p>
+          <a:p>
+            <a:endParaRPr lang="en-US" dirty="0" smtClean="0"/>
+          </a:p>
+          <a:p>
+            <a:r>
+              <a:rPr lang="en-US" dirty="0" smtClean="0"/>
+              <a:t>Or allow the user to quit by typing “quit”.</a:t>
+            </a:r>
+          </a:p>
+          <a:p>
+            <a:endParaRPr lang="en-US" dirty="0" smtClean="0"/>
+          </a:p>
+          <a:p>
+            <a:r>
+              <a:rPr lang="en-US" dirty="0" smtClean="0"/>
+              <a:t>Have the program not terminate on wrong answers but give a report at the end</a:t>
+            </a:r>
+          </a:p>
+          <a:p>
+            <a:r>
+              <a:rPr lang="en-US" dirty="0" smtClean="0"/>
+              <a:t>summarizing which amino acids were gotten right and wrong how many times.</a:t>
             </a:r>
             <a:endParaRPr lang="en-US" dirty="0"/>
           </a:p>

</xml_diff>